<commit_message>
Insight Software Tests Preparation
</commit_message>
<xml_diff>
--- a/sketches/workshop/2015-02-18-WorkshopCompwareEngineering.pptx
+++ b/sketches/workshop/2015-02-18-WorkshopCompwareEngineering.pptx
@@ -146,10 +146,10 @@
   </p:defaultTextStyle>
   <p:extLst>
     <p:ext uri="{EFAFB233-063F-42B5-8137-9DF3F51BA10A}">
-      <p15:sldGuideLst xmlns="" xmlns:p15="http://schemas.microsoft.com/office/powerpoint/2012/main"/>
+      <p15:sldGuideLst xmlns:p15="http://schemas.microsoft.com/office/powerpoint/2012/main" xmlns=""/>
     </p:ext>
     <p:ext uri="{2D200454-40CA-4A62-9FC3-DE9A4176ACB9}">
-      <p15:notesGuideLst xmlns="" xmlns:p15="http://schemas.microsoft.com/office/powerpoint/2012/main"/>
+      <p15:notesGuideLst xmlns:p15="http://schemas.microsoft.com/office/powerpoint/2012/main" xmlns=""/>
     </p:ext>
   </p:extLst>
 </p:presentation>
@@ -237,7 +237,7 @@
           <a:p>
             <a:fld id="{3210969C-BE93-4BED-81E5-E22BCD571348}" type="datetimeFigureOut">
               <a:rPr lang="de-DE" smtClean="0"/>
-              <a:t>16.02.2015</a:t>
+              <a:t>27.02.2015</a:t>
             </a:fld>
             <a:endParaRPr lang="de-DE"/>
           </a:p>
@@ -402,7 +402,7 @@
           <a:p>
             <a:fld id="{6AF30475-D447-4086-A172-E5D2E3A015F3}" type="datetimeFigureOut">
               <a:rPr lang="de-DE" smtClean="0"/>
-              <a:t>16.02.2015</a:t>
+              <a:t>27.02.2015</a:t>
             </a:fld>
             <a:endParaRPr lang="de-DE"/>
           </a:p>
@@ -5644,7 +5644,7 @@
             <a:fld id="{0145FF8F-96EF-43E0-B953-12C6F9FFA3E5}" type="datetime1">
               <a:rPr lang="de-DE"/>
               <a:pPr/>
-              <a:t>16.02.2015</a:t>
+              <a:t>27.02.2015</a:t>
             </a:fld>
             <a:endParaRPr lang="de-DE"/>
           </a:p>
@@ -6408,7 +6408,7 @@
   </p:timing>
   <p:extLst mod="1">
     <p:ext uri="{DCECCB84-F9BA-43D5-87BE-67443E8EF086}">
-      <p15:sldGuideLst xmlns="" xmlns:p15="http://schemas.microsoft.com/office/powerpoint/2012/main">
+      <p15:sldGuideLst xmlns:p15="http://schemas.microsoft.com/office/powerpoint/2012/main" xmlns="">
         <p15:guide id="1" orient="horz" pos="2160" userDrawn="1">
           <p15:clr>
             <a:srgbClr val="FBAE40"/>
@@ -9707,7 +9707,15 @@
           <a:p>
             <a:r>
               <a:rPr lang="de-DE" dirty="0" smtClean="0"/>
-              <a:t>Seit 2011 bei Centigrade</a:t>
+              <a:t>Seit </a:t>
+            </a:r>
+            <a:r>
+              <a:rPr lang="de-DE" dirty="0" smtClean="0"/>
+              <a:t>2012 </a:t>
+            </a:r>
+            <a:r>
+              <a:rPr lang="de-DE" dirty="0" smtClean="0"/>
+              <a:t>bei Centigrade</a:t>
             </a:r>
             <a:endParaRPr lang="de-DE" dirty="0"/>
           </a:p>
@@ -10974,14 +10982,12 @@
               <a:rPr lang="de-DE" dirty="0" smtClean="0"/>
               <a:t>Konstruktor hat jetzt Parameter</a:t>
             </a:r>
-            <a:endParaRPr lang="de-DE" dirty="0" smtClean="0"/>
           </a:p>
           <a:p>
             <a:r>
               <a:rPr lang="de-DE" dirty="0" smtClean="0"/>
               <a:t>Sind im Bootstrapper registriert</a:t>
             </a:r>
-            <a:endParaRPr lang="de-DE" dirty="0" smtClean="0"/>
           </a:p>
           <a:p>
             <a:r>
@@ -10992,7 +10998,6 @@
               <a:rPr lang="de-DE" dirty="0" smtClean="0"/>
               <a:t> benutzen</a:t>
             </a:r>
-            <a:endParaRPr lang="de-DE" dirty="0" smtClean="0"/>
           </a:p>
         </p:txBody>
       </p:sp>
@@ -11422,7 +11427,6 @@
               <a:rPr lang="de-DE" dirty="0" smtClean="0"/>
               <a:t>Statisch zuordnen</a:t>
             </a:r>
-            <a:endParaRPr lang="de-DE" dirty="0" smtClean="0"/>
           </a:p>
           <a:p>
             <a:r>
@@ -11476,7 +11480,6 @@
               <a:rPr lang="de-DE" dirty="0" smtClean="0"/>
               <a:t> zeigt nichts an</a:t>
             </a:r>
-            <a:endParaRPr lang="de-DE" dirty="0" smtClean="0"/>
           </a:p>
         </p:txBody>
       </p:sp>
@@ -11587,14 +11590,12 @@
               <a:rPr lang="de-DE" dirty="0" smtClean="0"/>
               <a:t>Auslagern von Funktionalität</a:t>
             </a:r>
-            <a:endParaRPr lang="de-DE" dirty="0" smtClean="0"/>
           </a:p>
           <a:p>
             <a:r>
               <a:rPr lang="de-DE" dirty="0" smtClean="0"/>
               <a:t>Optionale Erweiterungen</a:t>
             </a:r>
-            <a:endParaRPr lang="de-DE" dirty="0" smtClean="0"/>
           </a:p>
           <a:p>
             <a:r>
@@ -11609,7 +11610,6 @@
               <a:rPr lang="de-DE" dirty="0" smtClean="0"/>
               <a:t> keine Abhängigkeiten</a:t>
             </a:r>
-            <a:endParaRPr lang="de-DE" dirty="0" smtClean="0"/>
           </a:p>
         </p:txBody>
       </p:sp>
@@ -11714,14 +11714,12 @@
               <a:rPr lang="de-DE" sz="3600" dirty="0" smtClean="0"/>
               <a:t>Dialoge darstellen</a:t>
             </a:r>
-            <a:endParaRPr lang="de-DE" sz="3600" dirty="0" smtClean="0"/>
           </a:p>
           <a:p>
             <a:r>
               <a:rPr lang="de-DE" dirty="0" smtClean="0"/>
               <a:t>Idee: Interaktionen müssen angefordert werden</a:t>
             </a:r>
-            <a:endParaRPr lang="de-DE" dirty="0" smtClean="0"/>
           </a:p>
           <a:p>
             <a:r>
@@ -11740,7 +11738,6 @@
               <a:rPr lang="de-DE" dirty="0" smtClean="0"/>
               <a:t>Dadurch optimales Styling der Fenster möglich</a:t>
             </a:r>
-            <a:endParaRPr lang="de-DE" dirty="0" smtClean="0"/>
           </a:p>
           <a:p>
             <a:endParaRPr lang="de-DE" dirty="0" smtClean="0"/>
@@ -11848,14 +11845,12 @@
               <a:rPr lang="de-DE" sz="3600" dirty="0" smtClean="0"/>
               <a:t>Ausblick</a:t>
             </a:r>
-            <a:endParaRPr lang="de-DE" sz="3600" dirty="0" smtClean="0"/>
           </a:p>
           <a:p>
             <a:r>
               <a:rPr lang="de-DE" dirty="0" smtClean="0"/>
               <a:t>Die verschiedenen WPF-Bausteine</a:t>
             </a:r>
-            <a:endParaRPr lang="de-DE" dirty="0" smtClean="0"/>
           </a:p>
           <a:p>
             <a:r>
@@ -11874,7 +11869,6 @@
               <a:rPr lang="de-DE" dirty="0" smtClean="0"/>
               <a:t>Performance von WPF</a:t>
             </a:r>
-            <a:endParaRPr lang="de-DE" dirty="0" smtClean="0"/>
           </a:p>
           <a:p>
             <a:endParaRPr lang="de-DE" dirty="0" smtClean="0"/>
@@ -11978,7 +11972,6 @@
               <a:rPr lang="de-DE" sz="3600" dirty="0" smtClean="0"/>
               <a:t>Fragen?</a:t>
             </a:r>
-            <a:endParaRPr lang="de-DE" sz="3600" dirty="0" smtClean="0"/>
           </a:p>
           <a:p>
             <a:endParaRPr lang="de-DE" dirty="0" smtClean="0"/>
@@ -13255,7 +13248,7 @@
   <a:extraClrSchemeLst/>
   <a:extLst>
     <a:ext uri="{05A4C25C-085E-4340-85A3-A5531E510DB2}">
-      <thm15:themeFamily xmlns="" xmlns:thm15="http://schemas.microsoft.com/office/thememl/2012/main" name="SEBASTIAN" id="{F92314A9-6073-451E-952E-FFD992C85D32}" vid="{BB8A925E-23EF-4B0E-AF10-95C6F4E29B12}"/>
+      <thm15:themeFamily xmlns:thm15="http://schemas.microsoft.com/office/thememl/2012/main" xmlns="" name="SEBASTIAN" id="{F92314A9-6073-451E-952E-FFD992C85D32}" vid="{BB8A925E-23EF-4B0E-AF10-95C6F4E29B12}"/>
     </a:ext>
   </a:extLst>
 </a:theme>
@@ -13801,7 +13794,7 @@
   <a:extraClrSchemeLst/>
   <a:extLst>
     <a:ext uri="{05A4C25C-085E-4340-85A3-A5531E510DB2}">
-      <thm15:themeFamily xmlns="" xmlns:thm15="http://schemas.microsoft.com/office/thememl/2012/main" name="Office Theme" id="{62F939B6-93AF-4DB8-9C6B-D6C7DFDC589F}" vid="{4A3C46E8-61CC-4603-A589-7422A47A8E4A}"/>
+      <thm15:themeFamily xmlns:thm15="http://schemas.microsoft.com/office/thememl/2012/main" xmlns="" name="Office Theme" id="{62F939B6-93AF-4DB8-9C6B-D6C7DFDC589F}" vid="{4A3C46E8-61CC-4603-A589-7422A47A8E4A}"/>
     </a:ext>
   </a:extLst>
 </a:theme>

</xml_diff>